<commit_message>
PPT bemutató 2. órai állapota
</commit_message>
<xml_diff>
--- a/VPN-hálózatok.pptx
+++ b/VPN-hálózatok.pptx
@@ -504,7 +504,7 @@
               <a:rPr lang="hu-HU" smtClean="0">
                 <a:latin typeface="Palatino Linotype" panose="02040502050505030304" pitchFamily="18" charset="0"/>
               </a:rPr>
-              <a:t>2022.09.12.</a:t>
+              <a:t>2022.09.14.</a:t>
             </a:fld>
             <a:endParaRPr lang="hu-HU">
               <a:latin typeface="Palatino Linotype" panose="02040502050505030304" pitchFamily="18" charset="0"/>
@@ -684,7 +684,7 @@
           <a:p>
             <a:fld id="{027C63A2-7164-45DA-A237-A67E130C8FB9}" type="datetime1">
               <a:rPr lang="hu-HU" noProof="0" smtClean="0"/>
-              <a:t>2022.09.12.</a:t>
+              <a:t>2022.09.14.</a:t>
             </a:fld>
             <a:endParaRPr lang="hu-HU" noProof="0"/>
           </a:p>
@@ -1619,7 +1619,7 @@
           <a:p>
             <a:fld id="{C3314F3C-67A4-4BB7-BC05-3D0688190736}" type="datetime1">
               <a:rPr lang="hu-HU" smtClean="0"/>
-              <a:t>2022.09.12.</a:t>
+              <a:t>2022.09.14.</a:t>
             </a:fld>
             <a:endParaRPr lang="hu-HU" dirty="0"/>
           </a:p>
@@ -1861,7 +1861,7 @@
           <a:p>
             <a:fld id="{0BD2146C-7DA0-410A-A64D-87F664E742A9}" type="datetime1">
               <a:rPr lang="hu-HU" smtClean="0"/>
-              <a:t>2022.09.12.</a:t>
+              <a:t>2022.09.14.</a:t>
             </a:fld>
             <a:endParaRPr lang="hu-HU" dirty="0"/>
           </a:p>
@@ -2110,7 +2110,7 @@
           <a:p>
             <a:fld id="{85611632-7CB1-4B6C-9D69-28C04DD199B0}" type="datetime1">
               <a:rPr lang="hu-HU" smtClean="0"/>
-              <a:t>2022.09.12.</a:t>
+              <a:t>2022.09.14.</a:t>
             </a:fld>
             <a:endParaRPr lang="hu-HU" dirty="0"/>
           </a:p>
@@ -2393,7 +2393,7 @@
           <a:p>
             <a:fld id="{215C999E-8E59-4BB4-937F-D740C29819A4}" type="datetime1">
               <a:rPr lang="hu-HU" smtClean="0"/>
-              <a:t>2022.09.12.</a:t>
+              <a:t>2022.09.14.</a:t>
             </a:fld>
             <a:endParaRPr lang="hu-HU" dirty="0"/>
           </a:p>
@@ -2846,7 +2846,7 @@
           <a:p>
             <a:fld id="{9BEEE4E3-CB32-4071-9E04-2BF7DE420A08}" type="datetime1">
               <a:rPr lang="hu-HU" smtClean="0"/>
-              <a:t>2022.09.12.</a:t>
+              <a:t>2022.09.14.</a:t>
             </a:fld>
             <a:endParaRPr lang="hu-HU" dirty="0"/>
           </a:p>
@@ -3185,7 +3185,7 @@
           <a:p>
             <a:fld id="{1F35C951-6711-43E4-A136-842C16F113DE}" type="datetime1">
               <a:rPr lang="hu-HU" smtClean="0"/>
-              <a:t>2022.09.12.</a:t>
+              <a:t>2022.09.14.</a:t>
             </a:fld>
             <a:endParaRPr lang="hu-HU" dirty="0"/>
           </a:p>
@@ -3652,7 +3652,7 @@
           <a:p>
             <a:fld id="{17A4DB6E-E413-4B47-87C3-72E8A9F98512}" type="datetime1">
               <a:rPr lang="hu-HU" smtClean="0"/>
-              <a:t>2022.09.12.</a:t>
+              <a:t>2022.09.14.</a:t>
             </a:fld>
             <a:endParaRPr lang="hu-HU" dirty="0"/>
           </a:p>
@@ -3817,7 +3817,7 @@
           <a:p>
             <a:fld id="{5D57FE49-6D9E-4C8F-A53D-77EB00FD10B9}" type="datetime1">
               <a:rPr lang="hu-HU" noProof="0" smtClean="0"/>
-              <a:t>2022.09.12.</a:t>
+              <a:t>2022.09.14.</a:t>
             </a:fld>
             <a:endParaRPr lang="hu-HU" noProof="0"/>
           </a:p>
@@ -3947,7 +3947,7 @@
           <a:p>
             <a:fld id="{FEC845B7-637E-4143-B2AF-5AE091C2EBB0}" type="datetime1">
               <a:rPr lang="hu-HU" smtClean="0"/>
-              <a:t>2022.09.12.</a:t>
+              <a:t>2022.09.14.</a:t>
             </a:fld>
             <a:endParaRPr lang="hu-HU" dirty="0"/>
           </a:p>
@@ -4284,7 +4284,7 @@
           <a:p>
             <a:fld id="{9BB758CA-6997-4433-9EFA-55421D0724F0}" type="datetime1">
               <a:rPr lang="hu-HU" smtClean="0"/>
-              <a:t>2022.09.12.</a:t>
+              <a:t>2022.09.14.</a:t>
             </a:fld>
             <a:endParaRPr lang="hu-HU" dirty="0"/>
           </a:p>
@@ -4603,7 +4603,7 @@
           <a:p>
             <a:fld id="{B5E25174-839A-4F8F-B5E0-77E5D6BCCE58}" type="datetime1">
               <a:rPr lang="hu-HU" smtClean="0"/>
-              <a:t>2022.09.12.</a:t>
+              <a:t>2022.09.14.</a:t>
             </a:fld>
             <a:endParaRPr lang="hu-HU" dirty="0"/>
           </a:p>
@@ -4971,7 +4971,7 @@
           <a:p>
             <a:fld id="{878E9537-2762-43A4-A1BF-58330BE90666}" type="datetime1">
               <a:rPr lang="hu-HU" noProof="0" smtClean="0"/>
-              <a:t>2022.09.12.</a:t>
+              <a:t>2022.09.14.</a:t>
             </a:fld>
             <a:endParaRPr lang="hu-HU" noProof="0"/>
           </a:p>
@@ -5446,8 +5446,8 @@
         </p:nvSpPr>
         <p:spPr>
           <a:xfrm>
-            <a:off x="431800" y="254000"/>
-            <a:ext cx="10972800" cy="1168400"/>
+            <a:off x="6043960" y="0"/>
+            <a:ext cx="6148039" cy="797932"/>
           </a:xfrm>
         </p:spPr>
         <p:txBody>
@@ -5659,8 +5659,8 @@
         </p:nvSpPr>
         <p:spPr>
           <a:xfrm>
-            <a:off x="609600" y="228600"/>
-            <a:ext cx="10972800" cy="1130300"/>
+            <a:off x="0" y="0"/>
+            <a:ext cx="10972800" cy="730405"/>
           </a:xfrm>
         </p:spPr>
         <p:txBody>
@@ -5685,15 +5685,27 @@
             <p:ph idx="1"/>
           </p:nvPr>
         </p:nvSpPr>
-        <p:spPr/>
+        <p:spPr>
+          <a:xfrm>
+            <a:off x="609600" y="1600201"/>
+            <a:ext cx="6917473" cy="4525963"/>
+          </a:xfrm>
+        </p:spPr>
         <p:txBody>
           <a:bodyPr/>
           <a:lstStyle/>
           <a:p>
             <a:r>
               <a:rPr lang="hu-HU" dirty="0" smtClean="0"/>
-              <a:t>Mobiltelefon, Táblagép</a:t>
-            </a:r>
+              <a:t>Mobiltelefon, </a:t>
+            </a:r>
+            <a:r>
+              <a:rPr lang="hu-HU" dirty="0" smtClean="0"/>
+              <a:t>Táblagép: Alkalmazásként</a:t>
+            </a:r>
+          </a:p>
+          <a:p>
+            <a:endParaRPr lang="hu-HU" dirty="0" smtClean="0"/>
           </a:p>
           <a:p>
             <a:endParaRPr lang="hu-HU" dirty="0"/>
@@ -5701,17 +5713,92 @@
           <a:p>
             <a:r>
               <a:rPr lang="hu-HU" dirty="0" smtClean="0"/>
-              <a:t>PC, Laptop</a:t>
-            </a:r>
-          </a:p>
-          <a:p>
-            <a:endParaRPr lang="hu-HU"/>
-          </a:p>
-          <a:p>
-            <a:endParaRPr lang="hu-HU"/>
-          </a:p>
-        </p:txBody>
-      </p:sp>
+              <a:t>PC, </a:t>
+            </a:r>
+            <a:r>
+              <a:rPr lang="hu-HU" dirty="0" smtClean="0"/>
+              <a:t>Laptop: Asztali alkalmazásként,</a:t>
+            </a:r>
+          </a:p>
+          <a:p>
+            <a:pPr marL="0" indent="0">
+              <a:buNone/>
+            </a:pPr>
+            <a:r>
+              <a:rPr lang="hu-HU" dirty="0" smtClean="0"/>
+              <a:t> Böngésző kiegészítőként</a:t>
+            </a:r>
+          </a:p>
+          <a:p>
+            <a:endParaRPr lang="hu-HU" dirty="0" smtClean="0"/>
+          </a:p>
+          <a:p>
+            <a:endParaRPr lang="hu-HU" dirty="0"/>
+          </a:p>
+          <a:p>
+            <a:r>
+              <a:rPr lang="hu-HU" dirty="0" smtClean="0"/>
+              <a:t>Konzolok (Xbox, </a:t>
+            </a:r>
+            <a:r>
+              <a:rPr lang="hu-HU" dirty="0" err="1" smtClean="0"/>
+              <a:t>PlayStation</a:t>
+            </a:r>
+            <a:r>
+              <a:rPr lang="hu-HU" dirty="0" smtClean="0"/>
+              <a:t>): Alkalmazásként</a:t>
+            </a:r>
+            <a:endParaRPr lang="hu-HU" dirty="0" smtClean="0"/>
+          </a:p>
+          <a:p>
+            <a:endParaRPr lang="hu-HU" dirty="0"/>
+          </a:p>
+          <a:p>
+            <a:endParaRPr lang="hu-HU" dirty="0"/>
+          </a:p>
+        </p:txBody>
+      </p:sp>
+      <p:pic>
+        <p:nvPicPr>
+          <p:cNvPr id="1026" name="Picture 2" descr="https://b2c-contenthub.com/wp-content/uploads/2022/08/ExpressVPN_image1_white@2x-copy.jpg?quality=50&amp;strip=all"/>
+          <p:cNvPicPr>
+            <a:picLocks noChangeAspect="1" noChangeArrowheads="1"/>
+          </p:cNvPicPr>
+          <p:nvPr/>
+        </p:nvPicPr>
+        <p:blipFill>
+          <a:blip r:embed="rId3">
+            <a:extLst>
+              <a:ext uri="{28A0092B-C50C-407E-A947-70E740481C1C}">
+                <a14:useLocalDpi xmlns:a14="http://schemas.microsoft.com/office/drawing/2010/main" val="0"/>
+              </a:ext>
+            </a:extLst>
+          </a:blip>
+          <a:srcRect/>
+          <a:stretch>
+            <a:fillRect/>
+          </a:stretch>
+        </p:blipFill>
+        <p:spPr bwMode="auto">
+          <a:xfrm>
+            <a:off x="7716643" y="2287923"/>
+            <a:ext cx="4095673" cy="3150518"/>
+          </a:xfrm>
+          <a:prstGeom prst="rect">
+            <a:avLst/>
+          </a:prstGeom>
+          <a:noFill/>
+          <a:extLst>
+            <a:ext uri="{909E8E84-426E-40DD-AFC4-6F175D3DCCD1}">
+              <a14:hiddenFill xmlns:a14="http://schemas.microsoft.com/office/drawing/2010/main">
+                <a:solidFill>
+                  <a:srgbClr val="FFFFFF"/>
+                </a:solidFill>
+              </a14:hiddenFill>
+            </a:ext>
+          </a:extLst>
+        </p:spPr>
+      </p:pic>
     </p:spTree>
     <p:extLst>
       <p:ext uri="{BB962C8B-B14F-4D97-AF65-F5344CB8AC3E}">
@@ -5764,12 +5851,21 @@
             <p:ph type="title"/>
           </p:nvPr>
         </p:nvSpPr>
-        <p:spPr/>
+        <p:spPr>
+          <a:xfrm>
+            <a:off x="7422995" y="0"/>
+            <a:ext cx="4769005" cy="836341"/>
+          </a:xfrm>
+        </p:spPr>
         <p:txBody>
           <a:bodyPr/>
           <a:lstStyle/>
           <a:p>
-            <a:endParaRPr lang="hu-HU"/>
+            <a:r>
+              <a:rPr lang="hu-HU" dirty="0" smtClean="0"/>
+              <a:t>VPN Szoftverek</a:t>
+            </a:r>
+            <a:endParaRPr lang="hu-HU" dirty="0"/>
           </a:p>
         </p:txBody>
       </p:sp>
@@ -5783,15 +5879,298 @@
             <p:ph idx="1"/>
           </p:nvPr>
         </p:nvSpPr>
-        <p:spPr/>
-        <p:txBody>
-          <a:bodyPr/>
+        <p:spPr>
+          <a:xfrm>
+            <a:off x="609600" y="1042639"/>
+            <a:ext cx="10972800" cy="5581185"/>
+          </a:xfrm>
+        </p:spPr>
+        <p:txBody>
+          <a:bodyPr>
+            <a:normAutofit lnSpcReduction="10000"/>
+          </a:bodyPr>
           <a:lstStyle/>
           <a:p>
-            <a:endParaRPr lang="hu-HU"/>
-          </a:p>
-        </p:txBody>
-      </p:sp>
+            <a:r>
+              <a:rPr lang="hu-HU" dirty="0" smtClean="0"/>
+              <a:t>Express VPN</a:t>
+            </a:r>
+          </a:p>
+          <a:p>
+            <a:endParaRPr lang="hu-HU" dirty="0" smtClean="0"/>
+          </a:p>
+          <a:p>
+            <a:pPr algn="ctr"/>
+            <a:r>
+              <a:rPr lang="hu-HU" dirty="0" err="1" smtClean="0"/>
+              <a:t>Tunnelbear</a:t>
+            </a:r>
+            <a:r>
+              <a:rPr lang="hu-HU" dirty="0"/>
+              <a:t> </a:t>
+            </a:r>
+            <a:r>
+              <a:rPr lang="hu-HU" dirty="0" smtClean="0">
+                <a:solidFill>
+                  <a:srgbClr val="EDEBEB"/>
+                </a:solidFill>
+              </a:rPr>
+              <a:t>j</a:t>
+            </a:r>
+            <a:endParaRPr lang="hu-HU" dirty="0">
+              <a:solidFill>
+                <a:srgbClr val="EDEBEB"/>
+              </a:solidFill>
+            </a:endParaRPr>
+          </a:p>
+          <a:p>
+            <a:endParaRPr lang="hu-HU" dirty="0" smtClean="0"/>
+          </a:p>
+          <a:p>
+            <a:r>
+              <a:rPr lang="hu-HU" dirty="0" err="1" smtClean="0"/>
+              <a:t>Nord</a:t>
+            </a:r>
+            <a:r>
+              <a:rPr lang="hu-HU" dirty="0" smtClean="0"/>
+              <a:t> VPN</a:t>
+            </a:r>
+          </a:p>
+          <a:p>
+            <a:endParaRPr lang="hu-HU" dirty="0" smtClean="0"/>
+          </a:p>
+          <a:p>
+            <a:pPr algn="ctr"/>
+            <a:r>
+              <a:rPr lang="hu-HU" dirty="0" err="1" smtClean="0"/>
+              <a:t>Tomato</a:t>
+            </a:r>
+            <a:r>
+              <a:rPr lang="hu-HU" dirty="0"/>
+              <a:t> </a:t>
+            </a:r>
+            <a:r>
+              <a:rPr lang="hu-HU" dirty="0" smtClean="0"/>
+              <a:t>VPN</a:t>
+            </a:r>
+          </a:p>
+          <a:p>
+            <a:pPr marL="0" indent="0">
+              <a:buNone/>
+            </a:pPr>
+            <a:endParaRPr lang="hu-HU" dirty="0" smtClean="0"/>
+          </a:p>
+          <a:p>
+            <a:r>
+              <a:rPr lang="hu-HU" dirty="0" err="1" smtClean="0"/>
+              <a:t>Surfshark</a:t>
+            </a:r>
+            <a:endParaRPr lang="hu-HU" dirty="0" smtClean="0"/>
+          </a:p>
+          <a:p>
+            <a:endParaRPr lang="hu-HU" dirty="0" smtClean="0"/>
+          </a:p>
+          <a:p>
+            <a:endParaRPr lang="hu-HU" dirty="0"/>
+          </a:p>
+          <a:p>
+            <a:endParaRPr lang="hu-HU" dirty="0" smtClean="0"/>
+          </a:p>
+          <a:p>
+            <a:r>
+              <a:rPr lang="hu-HU" dirty="0" err="1"/>
+              <a:t>Cyberghost</a:t>
+            </a:r>
+            <a:r>
+              <a:rPr lang="hu-HU" dirty="0"/>
+              <a:t> </a:t>
+            </a:r>
+          </a:p>
+          <a:p>
+            <a:endParaRPr lang="hu-HU" dirty="0"/>
+          </a:p>
+        </p:txBody>
+      </p:sp>
+      <p:pic>
+        <p:nvPicPr>
+          <p:cNvPr id="2" name="Kép 1"/>
+          <p:cNvPicPr>
+            <a:picLocks noChangeAspect="1"/>
+          </p:cNvPicPr>
+          <p:nvPr/>
+        </p:nvPicPr>
+        <p:blipFill>
+          <a:blip r:embed="rId3">
+            <a:extLst>
+              <a:ext uri="{28A0092B-C50C-407E-A947-70E740481C1C}">
+                <a14:useLocalDpi xmlns:a14="http://schemas.microsoft.com/office/drawing/2010/main" val="0"/>
+              </a:ext>
+            </a:extLst>
+          </a:blip>
+          <a:stretch>
+            <a:fillRect/>
+          </a:stretch>
+        </p:blipFill>
+        <p:spPr>
+          <a:xfrm>
+            <a:off x="3063715" y="964840"/>
+            <a:ext cx="2274849" cy="435420"/>
+          </a:xfrm>
+          <a:prstGeom prst="rect">
+            <a:avLst/>
+          </a:prstGeom>
+        </p:spPr>
+      </p:pic>
+      <p:pic>
+        <p:nvPicPr>
+          <p:cNvPr id="7" name="Kép 6"/>
+          <p:cNvPicPr>
+            <a:picLocks noChangeAspect="1"/>
+          </p:cNvPicPr>
+          <p:nvPr/>
+        </p:nvPicPr>
+        <p:blipFill>
+          <a:blip r:embed="rId4">
+            <a:extLst>
+              <a:ext uri="{28A0092B-C50C-407E-A947-70E740481C1C}">
+                <a14:useLocalDpi xmlns:a14="http://schemas.microsoft.com/office/drawing/2010/main" val="0"/>
+              </a:ext>
+            </a:extLst>
+          </a:blip>
+          <a:stretch>
+            <a:fillRect/>
+          </a:stretch>
+        </p:blipFill>
+        <p:spPr>
+          <a:xfrm>
+            <a:off x="3115331" y="4028767"/>
+            <a:ext cx="996176" cy="996176"/>
+          </a:xfrm>
+          <a:prstGeom prst="rect">
+            <a:avLst/>
+          </a:prstGeom>
+        </p:spPr>
+      </p:pic>
+      <p:pic>
+        <p:nvPicPr>
+          <p:cNvPr id="8" name="Kép 7"/>
+          <p:cNvPicPr>
+            <a:picLocks noChangeAspect="1"/>
+          </p:cNvPicPr>
+          <p:nvPr/>
+        </p:nvPicPr>
+        <p:blipFill>
+          <a:blip r:embed="rId5">
+            <a:extLst>
+              <a:ext uri="{28A0092B-C50C-407E-A947-70E740481C1C}">
+                <a14:useLocalDpi xmlns:a14="http://schemas.microsoft.com/office/drawing/2010/main" val="0"/>
+              </a:ext>
+            </a:extLst>
+          </a:blip>
+          <a:stretch>
+            <a:fillRect/>
+          </a:stretch>
+        </p:blipFill>
+        <p:spPr>
+          <a:xfrm>
+            <a:off x="3119048" y="2392579"/>
+            <a:ext cx="1066376" cy="902865"/>
+          </a:xfrm>
+          <a:prstGeom prst="rect">
+            <a:avLst/>
+          </a:prstGeom>
+        </p:spPr>
+      </p:pic>
+      <p:pic>
+        <p:nvPicPr>
+          <p:cNvPr id="11" name="Kép 10"/>
+          <p:cNvPicPr>
+            <a:picLocks noChangeAspect="1"/>
+          </p:cNvPicPr>
+          <p:nvPr/>
+        </p:nvPicPr>
+        <p:blipFill>
+          <a:blip r:embed="rId6">
+            <a:extLst>
+              <a:ext uri="{28A0092B-C50C-407E-A947-70E740481C1C}">
+                <a14:useLocalDpi xmlns:a14="http://schemas.microsoft.com/office/drawing/2010/main" val="0"/>
+              </a:ext>
+            </a:extLst>
+          </a:blip>
+          <a:stretch>
+            <a:fillRect/>
+          </a:stretch>
+        </p:blipFill>
+        <p:spPr>
+          <a:xfrm>
+            <a:off x="3115331" y="5494020"/>
+            <a:ext cx="997644" cy="997644"/>
+          </a:xfrm>
+          <a:prstGeom prst="rect">
+            <a:avLst/>
+          </a:prstGeom>
+        </p:spPr>
+      </p:pic>
+      <p:pic>
+        <p:nvPicPr>
+          <p:cNvPr id="13" name="Kép 12"/>
+          <p:cNvPicPr>
+            <a:picLocks noChangeAspect="1"/>
+          </p:cNvPicPr>
+          <p:nvPr/>
+        </p:nvPicPr>
+        <p:blipFill>
+          <a:blip r:embed="rId7">
+            <a:extLst>
+              <a:ext uri="{28A0092B-C50C-407E-A947-70E740481C1C}">
+                <a14:useLocalDpi xmlns:a14="http://schemas.microsoft.com/office/drawing/2010/main" val="0"/>
+              </a:ext>
+            </a:extLst>
+          </a:blip>
+          <a:stretch>
+            <a:fillRect/>
+          </a:stretch>
+        </p:blipFill>
+        <p:spPr>
+          <a:xfrm>
+            <a:off x="7147931" y="1466907"/>
+            <a:ext cx="1158234" cy="1238296"/>
+          </a:xfrm>
+          <a:prstGeom prst="rect">
+            <a:avLst/>
+          </a:prstGeom>
+        </p:spPr>
+      </p:pic>
+      <p:pic>
+        <p:nvPicPr>
+          <p:cNvPr id="14" name="Kép 13"/>
+          <p:cNvPicPr>
+            <a:picLocks noChangeAspect="1"/>
+          </p:cNvPicPr>
+          <p:nvPr/>
+        </p:nvPicPr>
+        <p:blipFill>
+          <a:blip r:embed="rId8">
+            <a:extLst>
+              <a:ext uri="{28A0092B-C50C-407E-A947-70E740481C1C}">
+                <a14:useLocalDpi xmlns:a14="http://schemas.microsoft.com/office/drawing/2010/main" val="0"/>
+              </a:ext>
+            </a:extLst>
+          </a:blip>
+          <a:stretch>
+            <a:fillRect/>
+          </a:stretch>
+        </p:blipFill>
+        <p:spPr>
+          <a:xfrm>
+            <a:off x="7422995" y="3295444"/>
+            <a:ext cx="1018783" cy="1018783"/>
+          </a:xfrm>
+          <a:prstGeom prst="rect">
+            <a:avLst/>
+          </a:prstGeom>
+        </p:spPr>
+      </p:pic>
     </p:spTree>
     <p:extLst>
       <p:ext uri="{BB962C8B-B14F-4D97-AF65-F5344CB8AC3E}">
@@ -5836,7 +6215,7 @@
       </p:grpSpPr>
       <p:sp>
         <p:nvSpPr>
-          <p:cNvPr id="4" name="Cím 3"/>
+          <p:cNvPr id="3" name="Cím 2"/>
           <p:cNvSpPr>
             <a:spLocks noGrp="1"/>
           </p:cNvSpPr>
@@ -5849,13 +6228,17 @@
           <a:bodyPr/>
           <a:lstStyle/>
           <a:p>
-            <a:endParaRPr lang="hu-HU"/>
-          </a:p>
-        </p:txBody>
-      </p:sp>
-      <p:sp>
-        <p:nvSpPr>
-          <p:cNvPr id="5" name="Tartalom helye 4"/>
+            <a:r>
+              <a:rPr lang="hu-HU" dirty="0" smtClean="0"/>
+              <a:t>VPN Felületek</a:t>
+            </a:r>
+            <a:endParaRPr lang="hu-HU" dirty="0"/>
+          </a:p>
+        </p:txBody>
+      </p:sp>
+      <p:sp>
+        <p:nvSpPr>
+          <p:cNvPr id="6" name="Tartalom helye 5"/>
           <p:cNvSpPr>
             <a:spLocks noGrp="1"/>
           </p:cNvSpPr>

</xml_diff>

<commit_message>
PPT kész állapota (teljes)
</commit_message>
<xml_diff>
--- a/VPN-hálózatok.pptx
+++ b/VPN-hálózatok.pptx
@@ -7058,6 +7058,30 @@
               </a:rPr>
               <a:t>/</a:t>
             </a:r>
+            <a:endParaRPr lang="hu-HU" dirty="0" smtClean="0"/>
+          </a:p>
+          <a:p>
+            <a:r>
+              <a:rPr lang="hu-HU">
+                <a:hlinkClick r:id="rId6"/>
+              </a:rPr>
+              <a:t>https</a:t>
+            </a:r>
+            <a:r>
+              <a:rPr lang="hu-HU">
+                <a:hlinkClick r:id="rId6"/>
+              </a:rPr>
+              <a:t>://</a:t>
+            </a:r>
+            <a:r>
+              <a:rPr lang="hu-HU" smtClean="0">
+                <a:hlinkClick r:id="rId6"/>
+              </a:rPr>
+              <a:t>surfshark.com/download</a:t>
+            </a:r>
+            <a:endParaRPr lang="hu-HU" smtClean="0"/>
+          </a:p>
+          <a:p>
             <a:endParaRPr lang="hu-HU" dirty="0" smtClean="0"/>
           </a:p>
           <a:p>

</xml_diff>

<commit_message>
PPT kész állapota (teljesen teljes)
</commit_message>
<xml_diff>
--- a/VPN-hálózatok.pptx
+++ b/VPN-hálózatok.pptx
@@ -7062,24 +7062,18 @@
           </a:p>
           <a:p>
             <a:r>
-              <a:rPr lang="hu-HU">
+              <a:rPr lang="hu-HU" dirty="0">
                 <a:hlinkClick r:id="rId6"/>
               </a:rPr>
-              <a:t>https</a:t>
-            </a:r>
-            <a:r>
-              <a:rPr lang="hu-HU">
-                <a:hlinkClick r:id="rId6"/>
-              </a:rPr>
-              <a:t>://</a:t>
-            </a:r>
-            <a:r>
-              <a:rPr lang="hu-HU" smtClean="0">
+              <a:t>https://</a:t>
+            </a:r>
+            <a:r>
+              <a:rPr lang="hu-HU" dirty="0" smtClean="0">
                 <a:hlinkClick r:id="rId6"/>
               </a:rPr>
               <a:t>surfshark.com/download</a:t>
             </a:r>
-            <a:endParaRPr lang="hu-HU" smtClean="0"/>
+            <a:endParaRPr lang="hu-HU" dirty="0" smtClean="0"/>
           </a:p>
           <a:p>
             <a:endParaRPr lang="hu-HU" dirty="0" smtClean="0"/>

</xml_diff>